<commit_message>
Fin première version de la documentation. RAF: - Config R-Pi - Description détaillée adaptation signal - Annexes
</commit_message>
<xml_diff>
--- a/Documents/Illustrations.pptx
+++ b/Documents/Illustrations.pptx
@@ -211,7 +211,7 @@
             <a:fld id="{1C966316-034C-416A-AE06-6FE0DCD4C173}" type="datetimeFigureOut">
               <a:rPr lang="fr-FR" smtClean="0"/>
               <a:pPr/>
-              <a:t>15/09/2014</a:t>
+              <a:t>18/09/2014</a:t>
             </a:fld>
             <a:endParaRPr lang="fr-FR" dirty="0"/>
           </a:p>
@@ -373,7 +373,7 @@
             <a:fld id="{F399C80D-C92A-476A-9551-402BB76F7DC1}" type="datetimeFigureOut">
               <a:rPr lang="fr-FR" smtClean="0"/>
               <a:pPr/>
-              <a:t>15/09/2014</a:t>
+              <a:t>18/09/2014</a:t>
             </a:fld>
             <a:endParaRPr lang="fr-FR"/>
           </a:p>
@@ -821,7 +821,7 @@
             <a:fld id="{6FDB51E0-5E2A-4791-A4C4-EF44FFADB4E1}" type="datetimeFigureOut">
               <a:rPr lang="fr-FR" smtClean="0"/>
               <a:pPr/>
-              <a:t>15/09/2014</a:t>
+              <a:t>18/09/2014</a:t>
             </a:fld>
             <a:endParaRPr lang="fr-FR" dirty="0"/>
           </a:p>
@@ -988,7 +988,7 @@
             <a:fld id="{6FDB51E0-5E2A-4791-A4C4-EF44FFADB4E1}" type="datetimeFigureOut">
               <a:rPr lang="fr-FR" smtClean="0"/>
               <a:pPr/>
-              <a:t>15/09/2014</a:t>
+              <a:t>18/09/2014</a:t>
             </a:fld>
             <a:endParaRPr lang="fr-FR" dirty="0"/>
           </a:p>
@@ -1165,7 +1165,7 @@
             <a:fld id="{6FDB51E0-5E2A-4791-A4C4-EF44FFADB4E1}" type="datetimeFigureOut">
               <a:rPr lang="fr-FR" smtClean="0"/>
               <a:pPr/>
-              <a:t>15/09/2014</a:t>
+              <a:t>18/09/2014</a:t>
             </a:fld>
             <a:endParaRPr lang="fr-FR" dirty="0"/>
           </a:p>
@@ -1337,7 +1337,7 @@
             <a:fld id="{6FDB51E0-5E2A-4791-A4C4-EF44FFADB4E1}" type="datetimeFigureOut">
               <a:rPr lang="fr-FR" smtClean="0"/>
               <a:pPr/>
-              <a:t>15/09/2014</a:t>
+              <a:t>18/09/2014</a:t>
             </a:fld>
             <a:endParaRPr lang="fr-FR" dirty="0"/>
           </a:p>
@@ -1580,7 +1580,7 @@
             <a:fld id="{6FDB51E0-5E2A-4791-A4C4-EF44FFADB4E1}" type="datetimeFigureOut">
               <a:rPr lang="fr-FR" smtClean="0"/>
               <a:pPr/>
-              <a:t>15/09/2014</a:t>
+              <a:t>18/09/2014</a:t>
             </a:fld>
             <a:endParaRPr lang="fr-FR" dirty="0"/>
           </a:p>
@@ -1865,7 +1865,7 @@
             <a:fld id="{6FDB51E0-5E2A-4791-A4C4-EF44FFADB4E1}" type="datetimeFigureOut">
               <a:rPr lang="fr-FR" smtClean="0"/>
               <a:pPr/>
-              <a:t>15/09/2014</a:t>
+              <a:t>18/09/2014</a:t>
             </a:fld>
             <a:endParaRPr lang="fr-FR" dirty="0"/>
           </a:p>
@@ -2284,7 +2284,7 @@
             <a:fld id="{6FDB51E0-5E2A-4791-A4C4-EF44FFADB4E1}" type="datetimeFigureOut">
               <a:rPr lang="fr-FR" smtClean="0"/>
               <a:pPr/>
-              <a:t>15/09/2014</a:t>
+              <a:t>18/09/2014</a:t>
             </a:fld>
             <a:endParaRPr lang="fr-FR" dirty="0"/>
           </a:p>
@@ -2404,7 +2404,7 @@
             <a:fld id="{6FDB51E0-5E2A-4791-A4C4-EF44FFADB4E1}" type="datetimeFigureOut">
               <a:rPr lang="fr-FR" smtClean="0"/>
               <a:pPr/>
-              <a:t>15/09/2014</a:t>
+              <a:t>18/09/2014</a:t>
             </a:fld>
             <a:endParaRPr lang="fr-FR" dirty="0"/>
           </a:p>
@@ -2496,7 +2496,7 @@
             <a:fld id="{6FDB51E0-5E2A-4791-A4C4-EF44FFADB4E1}" type="datetimeFigureOut">
               <a:rPr lang="fr-FR" smtClean="0"/>
               <a:pPr/>
-              <a:t>15/09/2014</a:t>
+              <a:t>18/09/2014</a:t>
             </a:fld>
             <a:endParaRPr lang="fr-FR" dirty="0"/>
           </a:p>
@@ -2770,7 +2770,7 @@
             <a:fld id="{6FDB51E0-5E2A-4791-A4C4-EF44FFADB4E1}" type="datetimeFigureOut">
               <a:rPr lang="fr-FR" smtClean="0"/>
               <a:pPr/>
-              <a:t>15/09/2014</a:t>
+              <a:t>18/09/2014</a:t>
             </a:fld>
             <a:endParaRPr lang="fr-FR" dirty="0"/>
           </a:p>
@@ -3020,7 +3020,7 @@
             <a:fld id="{6FDB51E0-5E2A-4791-A4C4-EF44FFADB4E1}" type="datetimeFigureOut">
               <a:rPr lang="fr-FR" smtClean="0"/>
               <a:pPr/>
-              <a:t>15/09/2014</a:t>
+              <a:t>18/09/2014</a:t>
             </a:fld>
             <a:endParaRPr lang="fr-FR" dirty="0"/>
           </a:p>
@@ -3230,7 +3230,7 @@
             <a:fld id="{6FDB51E0-5E2A-4791-A4C4-EF44FFADB4E1}" type="datetimeFigureOut">
               <a:rPr lang="fr-FR" smtClean="0"/>
               <a:pPr/>
-              <a:t>15/09/2014</a:t>
+              <a:t>18/09/2014</a:t>
             </a:fld>
             <a:endParaRPr lang="fr-FR" dirty="0"/>
           </a:p>
@@ -9639,15 +9639,7 @@
                   <a:schemeClr val="tx1"/>
                 </a:solidFill>
               </a:rPr>
-              <a:t>Initialiser le fichier </a:t>
-            </a:r>
-            <a:r>
-              <a:rPr lang="fr-FR" sz="1100" dirty="0" smtClean="0">
-                <a:solidFill>
-                  <a:schemeClr val="tx1"/>
-                </a:solidFill>
-              </a:rPr>
-              <a:t>CSV</a:t>
+              <a:t>Initialiser le fichier CSV</a:t>
             </a:r>
             <a:endParaRPr lang="fr-FR" sz="1100" dirty="0">
               <a:solidFill>
@@ -9777,15 +9769,7 @@
                   <a:schemeClr val="tx1"/>
                 </a:solidFill>
               </a:rPr>
-              <a:t>Créer/Ouvrir le fichier </a:t>
-            </a:r>
-            <a:r>
-              <a:rPr lang="fr-FR" sz="1100" dirty="0" smtClean="0">
-                <a:solidFill>
-                  <a:schemeClr val="tx1"/>
-                </a:solidFill>
-              </a:rPr>
-              <a:t>CSV</a:t>
+              <a:t>Créer/Ouvrir le fichier CSV</a:t>
             </a:r>
             <a:endParaRPr lang="fr-FR" sz="1100" dirty="0">
               <a:solidFill>
@@ -9999,88 +9983,72 @@
                   <a:schemeClr val="tx1"/>
                 </a:solidFill>
               </a:rPr>
-              <a:t>Fermer le fichier </a:t>
-            </a:r>
+              <a:t>Fermer le fichier CSV</a:t>
+            </a:r>
+            <a:endParaRPr lang="fr-FR" sz="1100" dirty="0">
+              <a:solidFill>
+                <a:schemeClr val="tx1"/>
+              </a:solidFill>
+            </a:endParaRPr>
+          </a:p>
+        </p:txBody>
+      </p:sp>
+      <p:sp>
+        <p:nvSpPr>
+          <p:cNvPr id="20" name="Rectangle à coins arrondis 19"/>
+          <p:cNvSpPr/>
+          <p:nvPr/>
+        </p:nvSpPr>
+        <p:spPr>
+          <a:xfrm>
+            <a:off x="6068882" y="7138502"/>
+            <a:ext cx="1800000" cy="216000"/>
+          </a:xfrm>
+          <a:prstGeom prst="roundRect">
+            <a:avLst/>
+          </a:prstGeom>
+          <a:solidFill>
+            <a:schemeClr val="accent3">
+              <a:lumMod val="40000"/>
+              <a:lumOff val="60000"/>
+            </a:schemeClr>
+          </a:solidFill>
+          <a:ln>
+            <a:solidFill>
+              <a:schemeClr val="accent3">
+                <a:lumMod val="50000"/>
+              </a:schemeClr>
+            </a:solidFill>
+          </a:ln>
+        </p:spPr>
+        <p:style>
+          <a:lnRef idx="2">
+            <a:schemeClr val="accent1">
+              <a:shade val="50000"/>
+            </a:schemeClr>
+          </a:lnRef>
+          <a:fillRef idx="1">
+            <a:schemeClr val="accent1"/>
+          </a:fillRef>
+          <a:effectRef idx="0">
+            <a:schemeClr val="accent1"/>
+          </a:effectRef>
+          <a:fontRef idx="minor">
+            <a:schemeClr val="lt1"/>
+          </a:fontRef>
+        </p:style>
+        <p:txBody>
+          <a:bodyPr rtlCol="0" anchor="ctr"/>
+          <a:lstStyle/>
+          <a:p>
+            <a:pPr algn="ctr"/>
             <a:r>
               <a:rPr lang="fr-FR" sz="1100" dirty="0" smtClean="0">
                 <a:solidFill>
                   <a:schemeClr val="tx1"/>
                 </a:solidFill>
               </a:rPr>
-              <a:t>CSV</a:t>
-            </a:r>
-            <a:endParaRPr lang="fr-FR" sz="1100" dirty="0">
-              <a:solidFill>
-                <a:schemeClr val="tx1"/>
-              </a:solidFill>
-            </a:endParaRPr>
-          </a:p>
-        </p:txBody>
-      </p:sp>
-      <p:sp>
-        <p:nvSpPr>
-          <p:cNvPr id="20" name="Rectangle à coins arrondis 19"/>
-          <p:cNvSpPr/>
-          <p:nvPr/>
-        </p:nvSpPr>
-        <p:spPr>
-          <a:xfrm>
-            <a:off x="6068882" y="7138502"/>
-            <a:ext cx="1800000" cy="216000"/>
-          </a:xfrm>
-          <a:prstGeom prst="roundRect">
-            <a:avLst/>
-          </a:prstGeom>
-          <a:solidFill>
-            <a:schemeClr val="accent3">
-              <a:lumMod val="40000"/>
-              <a:lumOff val="60000"/>
-            </a:schemeClr>
-          </a:solidFill>
-          <a:ln>
-            <a:solidFill>
-              <a:schemeClr val="accent3">
-                <a:lumMod val="50000"/>
-              </a:schemeClr>
-            </a:solidFill>
-          </a:ln>
-        </p:spPr>
-        <p:style>
-          <a:lnRef idx="2">
-            <a:schemeClr val="accent1">
-              <a:shade val="50000"/>
-            </a:schemeClr>
-          </a:lnRef>
-          <a:fillRef idx="1">
-            <a:schemeClr val="accent1"/>
-          </a:fillRef>
-          <a:effectRef idx="0">
-            <a:schemeClr val="accent1"/>
-          </a:effectRef>
-          <a:fontRef idx="minor">
-            <a:schemeClr val="lt1"/>
-          </a:fontRef>
-        </p:style>
-        <p:txBody>
-          <a:bodyPr rtlCol="0" anchor="ctr"/>
-          <a:lstStyle/>
-          <a:p>
-            <a:pPr algn="ctr"/>
-            <a:r>
-              <a:rPr lang="fr-FR" sz="1100" dirty="0" smtClean="0">
-                <a:solidFill>
-                  <a:schemeClr val="tx1"/>
-                </a:solidFill>
-              </a:rPr>
-              <a:t>Ouvrir le fichier </a:t>
-            </a:r>
-            <a:r>
-              <a:rPr lang="fr-FR" sz="1100" dirty="0" smtClean="0">
-                <a:solidFill>
-                  <a:schemeClr val="tx1"/>
-                </a:solidFill>
-              </a:rPr>
-              <a:t>CSV</a:t>
+              <a:t>Ouvrir le fichier CSV</a:t>
             </a:r>
             <a:endParaRPr lang="fr-FR" sz="1100" dirty="0">
               <a:solidFill>
@@ -10213,15 +10181,7 @@
                   <a:schemeClr val="tx1"/>
                 </a:solidFill>
               </a:rPr>
-              <a:t>Fermer le fichier </a:t>
-            </a:r>
-            <a:r>
-              <a:rPr lang="fr-FR" sz="1100" dirty="0" smtClean="0">
-                <a:solidFill>
-                  <a:schemeClr val="tx1"/>
-                </a:solidFill>
-              </a:rPr>
-              <a:t>CSV</a:t>
+              <a:t>Fermer le fichier CSV</a:t>
             </a:r>
             <a:endParaRPr lang="fr-FR" sz="1100" dirty="0">
               <a:solidFill>
@@ -12831,15 +12791,7 @@
                   <a:schemeClr val="tx1"/>
                 </a:solidFill>
               </a:rPr>
-              <a:t>Initialiser le fichier </a:t>
-            </a:r>
-            <a:r>
-              <a:rPr lang="fr-FR" sz="1100" dirty="0" smtClean="0">
-                <a:solidFill>
-                  <a:schemeClr val="tx1"/>
-                </a:solidFill>
-              </a:rPr>
-              <a:t>CSV</a:t>
+              <a:t>Initialiser le fichier CSV</a:t>
             </a:r>
             <a:endParaRPr lang="fr-FR" sz="1100" dirty="0">
               <a:solidFill>
@@ -12969,15 +12921,7 @@
                   <a:schemeClr val="tx1"/>
                 </a:solidFill>
               </a:rPr>
-              <a:t>Créer/Ouvrir le fichier </a:t>
-            </a:r>
-            <a:r>
-              <a:rPr lang="fr-FR" sz="1100" dirty="0" smtClean="0">
-                <a:solidFill>
-                  <a:schemeClr val="tx1"/>
-                </a:solidFill>
-              </a:rPr>
-              <a:t>CSV</a:t>
+              <a:t>Créer/Ouvrir le fichier CSV</a:t>
             </a:r>
             <a:endParaRPr lang="fr-FR" sz="1100" dirty="0">
               <a:solidFill>
@@ -13191,88 +13135,72 @@
                   <a:schemeClr val="tx1"/>
                 </a:solidFill>
               </a:rPr>
-              <a:t>Fermer le fichier </a:t>
-            </a:r>
+              <a:t>Fermer le fichier CSV</a:t>
+            </a:r>
+            <a:endParaRPr lang="fr-FR" sz="1100" dirty="0">
+              <a:solidFill>
+                <a:schemeClr val="tx1"/>
+              </a:solidFill>
+            </a:endParaRPr>
+          </a:p>
+        </p:txBody>
+      </p:sp>
+      <p:sp>
+        <p:nvSpPr>
+          <p:cNvPr id="20" name="Rectangle à coins arrondis 19"/>
+          <p:cNvSpPr/>
+          <p:nvPr/>
+        </p:nvSpPr>
+        <p:spPr>
+          <a:xfrm>
+            <a:off x="6068882" y="7978191"/>
+            <a:ext cx="1800000" cy="216000"/>
+          </a:xfrm>
+          <a:prstGeom prst="roundRect">
+            <a:avLst/>
+          </a:prstGeom>
+          <a:solidFill>
+            <a:schemeClr val="accent3">
+              <a:lumMod val="40000"/>
+              <a:lumOff val="60000"/>
+            </a:schemeClr>
+          </a:solidFill>
+          <a:ln>
+            <a:solidFill>
+              <a:schemeClr val="accent3">
+                <a:lumMod val="50000"/>
+              </a:schemeClr>
+            </a:solidFill>
+          </a:ln>
+        </p:spPr>
+        <p:style>
+          <a:lnRef idx="2">
+            <a:schemeClr val="accent1">
+              <a:shade val="50000"/>
+            </a:schemeClr>
+          </a:lnRef>
+          <a:fillRef idx="1">
+            <a:schemeClr val="accent1"/>
+          </a:fillRef>
+          <a:effectRef idx="0">
+            <a:schemeClr val="accent1"/>
+          </a:effectRef>
+          <a:fontRef idx="minor">
+            <a:schemeClr val="lt1"/>
+          </a:fontRef>
+        </p:style>
+        <p:txBody>
+          <a:bodyPr rtlCol="0" anchor="ctr"/>
+          <a:lstStyle/>
+          <a:p>
+            <a:pPr algn="ctr"/>
             <a:r>
               <a:rPr lang="fr-FR" sz="1100" dirty="0" smtClean="0">
                 <a:solidFill>
                   <a:schemeClr val="tx1"/>
                 </a:solidFill>
               </a:rPr>
-              <a:t>CSV</a:t>
-            </a:r>
-            <a:endParaRPr lang="fr-FR" sz="1100" dirty="0">
-              <a:solidFill>
-                <a:schemeClr val="tx1"/>
-              </a:solidFill>
-            </a:endParaRPr>
-          </a:p>
-        </p:txBody>
-      </p:sp>
-      <p:sp>
-        <p:nvSpPr>
-          <p:cNvPr id="20" name="Rectangle à coins arrondis 19"/>
-          <p:cNvSpPr/>
-          <p:nvPr/>
-        </p:nvSpPr>
-        <p:spPr>
-          <a:xfrm>
-            <a:off x="6068882" y="7978191"/>
-            <a:ext cx="1800000" cy="216000"/>
-          </a:xfrm>
-          <a:prstGeom prst="roundRect">
-            <a:avLst/>
-          </a:prstGeom>
-          <a:solidFill>
-            <a:schemeClr val="accent3">
-              <a:lumMod val="40000"/>
-              <a:lumOff val="60000"/>
-            </a:schemeClr>
-          </a:solidFill>
-          <a:ln>
-            <a:solidFill>
-              <a:schemeClr val="accent3">
-                <a:lumMod val="50000"/>
-              </a:schemeClr>
-            </a:solidFill>
-          </a:ln>
-        </p:spPr>
-        <p:style>
-          <a:lnRef idx="2">
-            <a:schemeClr val="accent1">
-              <a:shade val="50000"/>
-            </a:schemeClr>
-          </a:lnRef>
-          <a:fillRef idx="1">
-            <a:schemeClr val="accent1"/>
-          </a:fillRef>
-          <a:effectRef idx="0">
-            <a:schemeClr val="accent1"/>
-          </a:effectRef>
-          <a:fontRef idx="minor">
-            <a:schemeClr val="lt1"/>
-          </a:fontRef>
-        </p:style>
-        <p:txBody>
-          <a:bodyPr rtlCol="0" anchor="ctr"/>
-          <a:lstStyle/>
-          <a:p>
-            <a:pPr algn="ctr"/>
-            <a:r>
-              <a:rPr lang="fr-FR" sz="1100" dirty="0" smtClean="0">
-                <a:solidFill>
-                  <a:schemeClr val="tx1"/>
-                </a:solidFill>
-              </a:rPr>
-              <a:t>Ouvrir le fichier </a:t>
-            </a:r>
-            <a:r>
-              <a:rPr lang="fr-FR" sz="1100" dirty="0" smtClean="0">
-                <a:solidFill>
-                  <a:schemeClr val="tx1"/>
-                </a:solidFill>
-              </a:rPr>
-              <a:t>CSV</a:t>
+              <a:t>Ouvrir le fichier CSV</a:t>
             </a:r>
             <a:endParaRPr lang="fr-FR" sz="1100" dirty="0">
               <a:solidFill>
@@ -13405,15 +13333,7 @@
                   <a:schemeClr val="tx1"/>
                 </a:solidFill>
               </a:rPr>
-              <a:t>Fermer le fichier </a:t>
-            </a:r>
-            <a:r>
-              <a:rPr lang="fr-FR" sz="1100" dirty="0" smtClean="0">
-                <a:solidFill>
-                  <a:schemeClr val="tx1"/>
-                </a:solidFill>
-              </a:rPr>
-              <a:t>CSV</a:t>
+              <a:t>Fermer le fichier CSV</a:t>
             </a:r>
             <a:endParaRPr lang="fr-FR" sz="1100" dirty="0">
               <a:solidFill>
@@ -15438,7 +15358,15 @@
                   <a:schemeClr val="tx1"/>
                 </a:solidFill>
               </a:rPr>
-              <a:t>ET Base</a:t>
+              <a:t>ET </a:t>
+            </a:r>
+            <a:r>
+              <a:rPr lang="fr-FR" sz="1100" dirty="0" smtClean="0">
+                <a:solidFill>
+                  <a:schemeClr val="tx1"/>
+                </a:solidFill>
+              </a:rPr>
+              <a:t>Papp</a:t>
             </a:r>
             <a:endParaRPr lang="fr-FR" sz="1100" dirty="0">
               <a:solidFill>
@@ -15877,7 +15805,7 @@
         </p:nvGraphicFramePr>
         <p:xfrm>
           <a:off x="3703572" y="4113715"/>
-          <a:ext cx="4684851" cy="648072"/>
+          <a:ext cx="4684852" cy="648072"/>
         </p:xfrm>
         <a:graphic>
           <a:graphicData uri="http://schemas.openxmlformats.org/drawingml/2006/table">
@@ -15886,10 +15814,9 @@
                 <a:tableStyleId>{5C22544A-7EE6-4342-B048-85BDC9FD1C3A}</a:tableStyleId>
               </a:tblPr>
               <a:tblGrid>
-                <a:gridCol w="1084452"/>
-                <a:gridCol w="1008112"/>
-                <a:gridCol w="1440160"/>
-                <a:gridCol w="1152127"/>
+                <a:gridCol w="1300476"/>
+                <a:gridCol w="1512168"/>
+                <a:gridCol w="1872208"/>
               </a:tblGrid>
               <a:tr h="648072">
                 <a:tc>
@@ -15973,33 +15900,6 @@
                     </a:solidFill>
                   </a:tcPr>
                 </a:tc>
-                <a:tc>
-                  <a:txBody>
-                    <a:bodyPr/>
-                    <a:lstStyle/>
-                    <a:p>
-                      <a:pPr algn="ctr"/>
-                      <a:r>
-                        <a:rPr lang="fr-FR" b="1" dirty="0" smtClean="0">
-                          <a:solidFill>
-                            <a:schemeClr val="tx1"/>
-                          </a:solidFill>
-                        </a:rPr>
-                        <a:t>[Invalide]</a:t>
-                      </a:r>
-                      <a:endParaRPr lang="fr-FR" b="1" dirty="0">
-                        <a:solidFill>
-                          <a:schemeClr val="tx1"/>
-                        </a:solidFill>
-                      </a:endParaRPr>
-                    </a:p>
-                  </a:txBody>
-                  <a:tcPr anchor="ctr">
-                    <a:solidFill>
-                      <a:schemeClr val="accent6"/>
-                    </a:solidFill>
-                  </a:tcPr>
-                </a:tc>
               </a:tr>
             </a:tbl>
           </a:graphicData>
@@ -16015,7 +15915,7 @@
         </p:nvGraphicFramePr>
         <p:xfrm>
           <a:off x="3703572" y="2331929"/>
-          <a:ext cx="4698301" cy="1552269"/>
+          <a:ext cx="4684852" cy="1552269"/>
         </p:xfrm>
         <a:graphic>
           <a:graphicData uri="http://schemas.openxmlformats.org/drawingml/2006/table">
@@ -16024,13 +15924,12 @@
                 <a:tableStyleId>{5C22544A-7EE6-4342-B048-85BDC9FD1C3A}</a:tableStyleId>
               </a:tblPr>
               <a:tblGrid>
-                <a:gridCol w="1062118"/>
-                <a:gridCol w="1062118"/>
-                <a:gridCol w="1363599"/>
-                <a:gridCol w="1210466"/>
+                <a:gridCol w="1300476"/>
+                <a:gridCol w="1512168"/>
+                <a:gridCol w="1872208"/>
               </a:tblGrid>
               <a:tr h="395503">
-                <a:tc gridSpan="4">
+                <a:tc gridSpan="3">
                   <a:txBody>
                     <a:bodyPr/>
                     <a:lstStyle/>
@@ -16085,19 +15984,9 @@
                   </a:txBody>
                   <a:tcPr/>
                 </a:tc>
-                <a:tc hMerge="1">
-                  <a:txBody>
-                    <a:bodyPr/>
-                    <a:lstStyle/>
-                    <a:p>
-                      <a:endParaRPr lang="fr-FR"/>
-                    </a:p>
-                  </a:txBody>
-                  <a:tcPr/>
-                </a:tc>
               </a:tr>
               <a:tr h="395503">
-                <a:tc gridSpan="4">
+                <a:tc gridSpan="3">
                   <a:txBody>
                     <a:bodyPr/>
                     <a:lstStyle/>
@@ -16144,19 +16033,9 @@
                   </a:txBody>
                   <a:tcPr/>
                 </a:tc>
-                <a:tc hMerge="1">
-                  <a:txBody>
-                    <a:bodyPr/>
-                    <a:lstStyle/>
-                    <a:p>
-                      <a:endParaRPr lang="fr-FR"/>
-                    </a:p>
-                  </a:txBody>
-                  <a:tcPr/>
-                </a:tc>
               </a:tr>
               <a:tr h="395503">
-                <a:tc gridSpan="4">
+                <a:tc gridSpan="3">
                   <a:txBody>
                     <a:bodyPr/>
                     <a:lstStyle/>
@@ -16174,16 +16053,6 @@
                       <a:schemeClr val="accent1"/>
                     </a:solidFill>
                   </a:tcPr>
-                </a:tc>
-                <a:tc hMerge="1">
-                  <a:txBody>
-                    <a:bodyPr/>
-                    <a:lstStyle/>
-                    <a:p>
-                      <a:endParaRPr lang="fr-FR"/>
-                    </a:p>
-                  </a:txBody>
-                  <a:tcPr/>
                 </a:tc>
                 <a:tc hMerge="1">
                   <a:txBody>
@@ -16276,12 +16145,12 @@
                         <a:t>[</a:t>
                       </a:r>
                       <a:r>
-                        <a:rPr lang="fr-FR" b="1" dirty="0" err="1" smtClean="0">
+                        <a:rPr lang="fr-FR" b="1" dirty="0" smtClean="0">
                           <a:solidFill>
                             <a:schemeClr val="bg1"/>
                           </a:solidFill>
                         </a:rPr>
-                        <a:t>NomIndex</a:t>
+                        <a:t>Nom Index</a:t>
                       </a:r>
                       <a:r>
                         <a:rPr lang="fr-FR" b="1" dirty="0" smtClean="0">
@@ -16290,33 +16159,6 @@
                           </a:solidFill>
                         </a:rPr>
                         <a:t>]</a:t>
-                      </a:r>
-                      <a:endParaRPr lang="fr-FR" b="1" dirty="0">
-                        <a:solidFill>
-                          <a:schemeClr val="bg1"/>
-                        </a:solidFill>
-                      </a:endParaRPr>
-                    </a:p>
-                  </a:txBody>
-                  <a:tcPr anchor="ctr">
-                    <a:solidFill>
-                      <a:schemeClr val="accent1"/>
-                    </a:solidFill>
-                  </a:tcPr>
-                </a:tc>
-                <a:tc>
-                  <a:txBody>
-                    <a:bodyPr/>
-                    <a:lstStyle/>
-                    <a:p>
-                      <a:pPr algn="ctr"/>
-                      <a:r>
-                        <a:rPr lang="fr-FR" b="1" dirty="0" smtClean="0">
-                          <a:solidFill>
-                            <a:schemeClr val="bg1"/>
-                          </a:solidFill>
-                        </a:rPr>
-                        <a:t>Invalide</a:t>
                       </a:r>
                       <a:endParaRPr lang="fr-FR" b="1" dirty="0">
                         <a:solidFill>
@@ -19090,23 +18932,7 @@
                   <a:schemeClr val="tx1"/>
                 </a:solidFill>
               </a:rPr>
-              <a:t>Choisir un fichier </a:t>
-            </a:r>
-            <a:r>
-              <a:rPr lang="fr-FR" sz="1100" dirty="0" smtClean="0">
-                <a:solidFill>
-                  <a:schemeClr val="tx1"/>
-                </a:solidFill>
-              </a:rPr>
-              <a:t>CSV </a:t>
-            </a:r>
-            <a:r>
-              <a:rPr lang="fr-FR" sz="1100" dirty="0" smtClean="0">
-                <a:solidFill>
-                  <a:schemeClr val="tx1"/>
-                </a:solidFill>
-              </a:rPr>
-              <a:t>[A41]</a:t>
+              <a:t>Choisir un fichier CSV [A41]</a:t>
             </a:r>
             <a:endParaRPr lang="fr-FR" sz="1100" dirty="0">
               <a:solidFill>
@@ -21879,11 +21705,7 @@
             <a:pPr algn="ctr"/>
             <a:r>
               <a:rPr lang="fr-FR" dirty="0" smtClean="0"/>
-              <a:t>Fichier </a:t>
-            </a:r>
-            <a:r>
-              <a:rPr lang="fr-FR" dirty="0" smtClean="0"/>
-              <a:t>CSV</a:t>
+              <a:t>Fichier CSV</a:t>
             </a:r>
             <a:endParaRPr lang="fr-FR" dirty="0"/>
           </a:p>
@@ -22957,11 +22779,7 @@
             <a:pPr algn="ctr"/>
             <a:r>
               <a:rPr lang="fr-FR" dirty="0" smtClean="0"/>
-              <a:t>Fichier </a:t>
-            </a:r>
-            <a:r>
-              <a:rPr lang="fr-FR" dirty="0" smtClean="0"/>
-              <a:t>CSV</a:t>
+              <a:t>Fichier CSV</a:t>
             </a:r>
             <a:endParaRPr lang="fr-FR" dirty="0"/>
           </a:p>
@@ -23336,11 +23154,7 @@
             <a:pPr algn="ctr"/>
             <a:r>
               <a:rPr lang="fr-FR" dirty="0" smtClean="0"/>
-              <a:t>Fichier </a:t>
-            </a:r>
-            <a:r>
-              <a:rPr lang="fr-FR" dirty="0" smtClean="0"/>
-              <a:t>CSV</a:t>
+              <a:t>Fichier CSV</a:t>
             </a:r>
             <a:endParaRPr lang="fr-FR" dirty="0"/>
           </a:p>
@@ -23863,11 +23677,7 @@
             <a:pPr algn="ctr"/>
             <a:r>
               <a:rPr lang="fr-FR" dirty="0" smtClean="0"/>
-              <a:t>Fichier </a:t>
-            </a:r>
-            <a:r>
-              <a:rPr lang="fr-FR" dirty="0" smtClean="0"/>
-              <a:t>CSV</a:t>
+              <a:t>Fichier CSV</a:t>
             </a:r>
             <a:endParaRPr lang="fr-FR" dirty="0"/>
           </a:p>
@@ -24910,11 +24720,7 @@
             <a:pPr algn="ctr"/>
             <a:r>
               <a:rPr lang="fr-FR" dirty="0" smtClean="0"/>
-              <a:t>Fichier </a:t>
-            </a:r>
-            <a:r>
-              <a:rPr lang="fr-FR" dirty="0" smtClean="0"/>
-              <a:t>CSV</a:t>
+              <a:t>Fichier CSV</a:t>
             </a:r>
             <a:endParaRPr lang="fr-FR" dirty="0"/>
           </a:p>
@@ -25213,15 +25019,7 @@
                   <a:schemeClr val="bg1"/>
                 </a:solidFill>
               </a:rPr>
-              <a:t>Importer le fichier </a:t>
-            </a:r>
-            <a:r>
-              <a:rPr lang="fr-FR" dirty="0" smtClean="0">
-                <a:solidFill>
-                  <a:schemeClr val="bg1"/>
-                </a:solidFill>
-              </a:rPr>
-              <a:t>CSV</a:t>
+              <a:t>Importer le fichier CSV</a:t>
             </a:r>
             <a:endParaRPr lang="fr-FR" dirty="0">
               <a:solidFill>

</xml_diff>